<commit_message>
Com as pg nos slides
</commit_message>
<xml_diff>
--- a/TCC/documentacao/ServitibaPP.pptx
+++ b/TCC/documentacao/ServitibaPP.pptx
@@ -4,6 +4,9 @@
   <p:sldMasterIdLst>
     <p:sldMasterId id="2147483738" r:id="rId1"/>
   </p:sldMasterIdLst>
+  <p:notesMasterIdLst>
+    <p:notesMasterId r:id="rId16"/>
+  </p:notesMasterIdLst>
   <p:sldIdLst>
     <p:sldId id="256" r:id="rId2"/>
     <p:sldId id="257" r:id="rId3"/>
@@ -125,6 +128,440 @@
 </p:presentation>
 </file>
 
+<file path=ppt/notesMasters/notesMaster1.xml><?xml version="1.0" encoding="utf-8"?>
+<p:notesMaster xmlns:a="http://schemas.openxmlformats.org/drawingml/2006/main" xmlns:r="http://schemas.openxmlformats.org/officeDocument/2006/relationships" xmlns:p="http://schemas.openxmlformats.org/presentationml/2006/main">
+  <p:cSld>
+    <p:bg>
+      <p:bgRef idx="1001">
+        <a:schemeClr val="bg1"/>
+      </p:bgRef>
+    </p:bg>
+    <p:spTree>
+      <p:nvGrpSpPr>
+        <p:cNvPr id="1" name=""/>
+        <p:cNvGrpSpPr/>
+        <p:nvPr/>
+      </p:nvGrpSpPr>
+      <p:grpSpPr>
+        <a:xfrm>
+          <a:off x="0" y="0"/>
+          <a:ext cx="0" cy="0"/>
+          <a:chOff x="0" y="0"/>
+          <a:chExt cx="0" cy="0"/>
+        </a:xfrm>
+      </p:grpSpPr>
+      <p:sp>
+        <p:nvSpPr>
+          <p:cNvPr id="2" name="Espaço Reservado para Cabeçalho 1"/>
+          <p:cNvSpPr>
+            <a:spLocks noGrp="1"/>
+          </p:cNvSpPr>
+          <p:nvPr>
+            <p:ph type="hdr" sz="quarter"/>
+          </p:nvPr>
+        </p:nvSpPr>
+        <p:spPr>
+          <a:xfrm>
+            <a:off x="0" y="0"/>
+            <a:ext cx="2971800" cy="458788"/>
+          </a:xfrm>
+          <a:prstGeom prst="rect">
+            <a:avLst/>
+          </a:prstGeom>
+        </p:spPr>
+        <p:txBody>
+          <a:bodyPr vert="horz" lIns="91440" tIns="45720" rIns="91440" bIns="45720" rtlCol="0"/>
+          <a:lstStyle>
+            <a:lvl1pPr algn="l">
+              <a:defRPr sz="1200"/>
+            </a:lvl1pPr>
+          </a:lstStyle>
+          <a:p>
+            <a:endParaRPr lang="pt-BR"/>
+          </a:p>
+        </p:txBody>
+      </p:sp>
+      <p:sp>
+        <p:nvSpPr>
+          <p:cNvPr id="3" name="Espaço Reservado para Data 2"/>
+          <p:cNvSpPr>
+            <a:spLocks noGrp="1"/>
+          </p:cNvSpPr>
+          <p:nvPr>
+            <p:ph type="dt" idx="1"/>
+          </p:nvPr>
+        </p:nvSpPr>
+        <p:spPr>
+          <a:xfrm>
+            <a:off x="3884613" y="0"/>
+            <a:ext cx="2971800" cy="458788"/>
+          </a:xfrm>
+          <a:prstGeom prst="rect">
+            <a:avLst/>
+          </a:prstGeom>
+        </p:spPr>
+        <p:txBody>
+          <a:bodyPr vert="horz" lIns="91440" tIns="45720" rIns="91440" bIns="45720" rtlCol="0"/>
+          <a:lstStyle>
+            <a:lvl1pPr algn="r">
+              <a:defRPr sz="1200"/>
+            </a:lvl1pPr>
+          </a:lstStyle>
+          <a:p>
+            <a:fld id="{8A3B47CC-DC6D-4D15-BCBD-8C3DCE221547}" type="datetimeFigureOut">
+              <a:rPr lang="pt-BR" smtClean="0"/>
+              <a:t>04/12/2019</a:t>
+            </a:fld>
+            <a:endParaRPr lang="pt-BR"/>
+          </a:p>
+        </p:txBody>
+      </p:sp>
+      <p:sp>
+        <p:nvSpPr>
+          <p:cNvPr id="4" name="Espaço Reservado para Imagem de Slide 3"/>
+          <p:cNvSpPr>
+            <a:spLocks noGrp="1" noRot="1" noChangeAspect="1"/>
+          </p:cNvSpPr>
+          <p:nvPr>
+            <p:ph type="sldImg" idx="2"/>
+          </p:nvPr>
+        </p:nvSpPr>
+        <p:spPr>
+          <a:xfrm>
+            <a:off x="685800" y="1143000"/>
+            <a:ext cx="5486400" cy="3086100"/>
+          </a:xfrm>
+          <a:prstGeom prst="rect">
+            <a:avLst/>
+          </a:prstGeom>
+          <a:noFill/>
+          <a:ln w="12700">
+            <a:solidFill>
+              <a:prstClr val="black"/>
+            </a:solidFill>
+          </a:ln>
+        </p:spPr>
+        <p:txBody>
+          <a:bodyPr vert="horz" lIns="91440" tIns="45720" rIns="91440" bIns="45720" rtlCol="0" anchor="ctr"/>
+          <a:lstStyle/>
+          <a:p>
+            <a:endParaRPr lang="pt-BR"/>
+          </a:p>
+        </p:txBody>
+      </p:sp>
+      <p:sp>
+        <p:nvSpPr>
+          <p:cNvPr id="5" name="Espaço Reservado para Anotações 4"/>
+          <p:cNvSpPr>
+            <a:spLocks noGrp="1"/>
+          </p:cNvSpPr>
+          <p:nvPr>
+            <p:ph type="body" sz="quarter" idx="3"/>
+          </p:nvPr>
+        </p:nvSpPr>
+        <p:spPr>
+          <a:xfrm>
+            <a:off x="685800" y="4400550"/>
+            <a:ext cx="5486400" cy="3600450"/>
+          </a:xfrm>
+          <a:prstGeom prst="rect">
+            <a:avLst/>
+          </a:prstGeom>
+        </p:spPr>
+        <p:txBody>
+          <a:bodyPr vert="horz" lIns="91440" tIns="45720" rIns="91440" bIns="45720" rtlCol="0"/>
+          <a:lstStyle/>
+          <a:p>
+            <a:pPr lvl="0"/>
+            <a:r>
+              <a:rPr lang="pt-BR" smtClean="0"/>
+              <a:t>Clique para editar o texto mestre</a:t>
+            </a:r>
+          </a:p>
+          <a:p>
+            <a:pPr lvl="1"/>
+            <a:r>
+              <a:rPr lang="pt-BR" smtClean="0"/>
+              <a:t>Segundo nível</a:t>
+            </a:r>
+          </a:p>
+          <a:p>
+            <a:pPr lvl="2"/>
+            <a:r>
+              <a:rPr lang="pt-BR" smtClean="0"/>
+              <a:t>Terceiro nível</a:t>
+            </a:r>
+          </a:p>
+          <a:p>
+            <a:pPr lvl="3"/>
+            <a:r>
+              <a:rPr lang="pt-BR" smtClean="0"/>
+              <a:t>Quarto nível</a:t>
+            </a:r>
+          </a:p>
+          <a:p>
+            <a:pPr lvl="4"/>
+            <a:r>
+              <a:rPr lang="pt-BR" smtClean="0"/>
+              <a:t>Quinto nível</a:t>
+            </a:r>
+            <a:endParaRPr lang="pt-BR"/>
+          </a:p>
+        </p:txBody>
+      </p:sp>
+      <p:sp>
+        <p:nvSpPr>
+          <p:cNvPr id="6" name="Espaço Reservado para Rodapé 5"/>
+          <p:cNvSpPr>
+            <a:spLocks noGrp="1"/>
+          </p:cNvSpPr>
+          <p:nvPr>
+            <p:ph type="ftr" sz="quarter" idx="4"/>
+          </p:nvPr>
+        </p:nvSpPr>
+        <p:spPr>
+          <a:xfrm>
+            <a:off x="0" y="8685213"/>
+            <a:ext cx="2971800" cy="458787"/>
+          </a:xfrm>
+          <a:prstGeom prst="rect">
+            <a:avLst/>
+          </a:prstGeom>
+        </p:spPr>
+        <p:txBody>
+          <a:bodyPr vert="horz" lIns="91440" tIns="45720" rIns="91440" bIns="45720" rtlCol="0" anchor="b"/>
+          <a:lstStyle>
+            <a:lvl1pPr algn="l">
+              <a:defRPr sz="1200"/>
+            </a:lvl1pPr>
+          </a:lstStyle>
+          <a:p>
+            <a:endParaRPr lang="pt-BR"/>
+          </a:p>
+        </p:txBody>
+      </p:sp>
+      <p:sp>
+        <p:nvSpPr>
+          <p:cNvPr id="7" name="Espaço Reservado para Número de Slide 6"/>
+          <p:cNvSpPr>
+            <a:spLocks noGrp="1"/>
+          </p:cNvSpPr>
+          <p:nvPr>
+            <p:ph type="sldNum" sz="quarter" idx="5"/>
+          </p:nvPr>
+        </p:nvSpPr>
+        <p:spPr>
+          <a:xfrm>
+            <a:off x="3884613" y="8685213"/>
+            <a:ext cx="2971800" cy="458787"/>
+          </a:xfrm>
+          <a:prstGeom prst="rect">
+            <a:avLst/>
+          </a:prstGeom>
+        </p:spPr>
+        <p:txBody>
+          <a:bodyPr vert="horz" lIns="91440" tIns="45720" rIns="91440" bIns="45720" rtlCol="0" anchor="b"/>
+          <a:lstStyle>
+            <a:lvl1pPr algn="r">
+              <a:defRPr sz="1200"/>
+            </a:lvl1pPr>
+          </a:lstStyle>
+          <a:p>
+            <a:fld id="{EB39817A-1F4F-4EA4-BA15-F3F705A53923}" type="slidenum">
+              <a:rPr lang="pt-BR" smtClean="0"/>
+              <a:t>‹nº›</a:t>
+            </a:fld>
+            <a:endParaRPr lang="pt-BR"/>
+          </a:p>
+        </p:txBody>
+      </p:sp>
+    </p:spTree>
+    <p:extLst>
+      <p:ext uri="{BB962C8B-B14F-4D97-AF65-F5344CB8AC3E}">
+        <p14:creationId xmlns:p14="http://schemas.microsoft.com/office/powerpoint/2010/main" val="2215572356"/>
+      </p:ext>
+    </p:extLst>
+  </p:cSld>
+  <p:clrMap bg1="lt1" tx1="dk1" bg2="lt2" tx2="dk2" accent1="accent1" accent2="accent2" accent3="accent3" accent4="accent4" accent5="accent5" accent6="accent6" hlink="hlink" folHlink="folHlink"/>
+  <p:notesStyle>
+    <a:lvl1pPr marL="0" algn="l" defTabSz="914400" rtl="0" eaLnBrk="1" latinLnBrk="0" hangingPunct="1">
+      <a:defRPr sz="1200" kern="1200">
+        <a:solidFill>
+          <a:schemeClr val="tx1"/>
+        </a:solidFill>
+        <a:latin typeface="+mn-lt"/>
+        <a:ea typeface="+mn-ea"/>
+        <a:cs typeface="+mn-cs"/>
+      </a:defRPr>
+    </a:lvl1pPr>
+    <a:lvl2pPr marL="457200" algn="l" defTabSz="914400" rtl="0" eaLnBrk="1" latinLnBrk="0" hangingPunct="1">
+      <a:defRPr sz="1200" kern="1200">
+        <a:solidFill>
+          <a:schemeClr val="tx1"/>
+        </a:solidFill>
+        <a:latin typeface="+mn-lt"/>
+        <a:ea typeface="+mn-ea"/>
+        <a:cs typeface="+mn-cs"/>
+      </a:defRPr>
+    </a:lvl2pPr>
+    <a:lvl3pPr marL="914400" algn="l" defTabSz="914400" rtl="0" eaLnBrk="1" latinLnBrk="0" hangingPunct="1">
+      <a:defRPr sz="1200" kern="1200">
+        <a:solidFill>
+          <a:schemeClr val="tx1"/>
+        </a:solidFill>
+        <a:latin typeface="+mn-lt"/>
+        <a:ea typeface="+mn-ea"/>
+        <a:cs typeface="+mn-cs"/>
+      </a:defRPr>
+    </a:lvl3pPr>
+    <a:lvl4pPr marL="1371600" algn="l" defTabSz="914400" rtl="0" eaLnBrk="1" latinLnBrk="0" hangingPunct="1">
+      <a:defRPr sz="1200" kern="1200">
+        <a:solidFill>
+          <a:schemeClr val="tx1"/>
+        </a:solidFill>
+        <a:latin typeface="+mn-lt"/>
+        <a:ea typeface="+mn-ea"/>
+        <a:cs typeface="+mn-cs"/>
+      </a:defRPr>
+    </a:lvl4pPr>
+    <a:lvl5pPr marL="1828800" algn="l" defTabSz="914400" rtl="0" eaLnBrk="1" latinLnBrk="0" hangingPunct="1">
+      <a:defRPr sz="1200" kern="1200">
+        <a:solidFill>
+          <a:schemeClr val="tx1"/>
+        </a:solidFill>
+        <a:latin typeface="+mn-lt"/>
+        <a:ea typeface="+mn-ea"/>
+        <a:cs typeface="+mn-cs"/>
+      </a:defRPr>
+    </a:lvl5pPr>
+    <a:lvl6pPr marL="2286000" algn="l" defTabSz="914400" rtl="0" eaLnBrk="1" latinLnBrk="0" hangingPunct="1">
+      <a:defRPr sz="1200" kern="1200">
+        <a:solidFill>
+          <a:schemeClr val="tx1"/>
+        </a:solidFill>
+        <a:latin typeface="+mn-lt"/>
+        <a:ea typeface="+mn-ea"/>
+        <a:cs typeface="+mn-cs"/>
+      </a:defRPr>
+    </a:lvl6pPr>
+    <a:lvl7pPr marL="2743200" algn="l" defTabSz="914400" rtl="0" eaLnBrk="1" latinLnBrk="0" hangingPunct="1">
+      <a:defRPr sz="1200" kern="1200">
+        <a:solidFill>
+          <a:schemeClr val="tx1"/>
+        </a:solidFill>
+        <a:latin typeface="+mn-lt"/>
+        <a:ea typeface="+mn-ea"/>
+        <a:cs typeface="+mn-cs"/>
+      </a:defRPr>
+    </a:lvl7pPr>
+    <a:lvl8pPr marL="3200400" algn="l" defTabSz="914400" rtl="0" eaLnBrk="1" latinLnBrk="0" hangingPunct="1">
+      <a:defRPr sz="1200" kern="1200">
+        <a:solidFill>
+          <a:schemeClr val="tx1"/>
+        </a:solidFill>
+        <a:latin typeface="+mn-lt"/>
+        <a:ea typeface="+mn-ea"/>
+        <a:cs typeface="+mn-cs"/>
+      </a:defRPr>
+    </a:lvl8pPr>
+    <a:lvl9pPr marL="3657600" algn="l" defTabSz="914400" rtl="0" eaLnBrk="1" latinLnBrk="0" hangingPunct="1">
+      <a:defRPr sz="1200" kern="1200">
+        <a:solidFill>
+          <a:schemeClr val="tx1"/>
+        </a:solidFill>
+        <a:latin typeface="+mn-lt"/>
+        <a:ea typeface="+mn-ea"/>
+        <a:cs typeface="+mn-cs"/>
+      </a:defRPr>
+    </a:lvl9pPr>
+  </p:notesStyle>
+</p:notesMaster>
+</file>
+
+<file path=ppt/notesSlides/notesSlide1.xml><?xml version="1.0" encoding="utf-8"?>
+<p:notes xmlns:a="http://schemas.openxmlformats.org/drawingml/2006/main" xmlns:r="http://schemas.openxmlformats.org/officeDocument/2006/relationships" xmlns:p="http://schemas.openxmlformats.org/presentationml/2006/main">
+  <p:cSld>
+    <p:spTree>
+      <p:nvGrpSpPr>
+        <p:cNvPr id="1" name=""/>
+        <p:cNvGrpSpPr/>
+        <p:nvPr/>
+      </p:nvGrpSpPr>
+      <p:grpSpPr>
+        <a:xfrm>
+          <a:off x="0" y="0"/>
+          <a:ext cx="0" cy="0"/>
+          <a:chOff x="0" y="0"/>
+          <a:chExt cx="0" cy="0"/>
+        </a:xfrm>
+      </p:grpSpPr>
+      <p:sp>
+        <p:nvSpPr>
+          <p:cNvPr id="2" name="Espaço Reservado para Imagem de Slide 1"/>
+          <p:cNvSpPr>
+            <a:spLocks noGrp="1" noRot="1" noChangeAspect="1"/>
+          </p:cNvSpPr>
+          <p:nvPr>
+            <p:ph type="sldImg"/>
+          </p:nvPr>
+        </p:nvSpPr>
+        <p:spPr/>
+      </p:sp>
+      <p:sp>
+        <p:nvSpPr>
+          <p:cNvPr id="3" name="Espaço Reservado para Anotações 2"/>
+          <p:cNvSpPr>
+            <a:spLocks noGrp="1"/>
+          </p:cNvSpPr>
+          <p:nvPr>
+            <p:ph type="body" idx="1"/>
+          </p:nvPr>
+        </p:nvSpPr>
+        <p:spPr/>
+        <p:txBody>
+          <a:bodyPr/>
+          <a:lstStyle/>
+          <a:p>
+            <a:endParaRPr lang="pt-BR"/>
+          </a:p>
+        </p:txBody>
+      </p:sp>
+      <p:sp>
+        <p:nvSpPr>
+          <p:cNvPr id="4" name="Espaço Reservado para Número de Slide 3"/>
+          <p:cNvSpPr>
+            <a:spLocks noGrp="1"/>
+          </p:cNvSpPr>
+          <p:nvPr>
+            <p:ph type="sldNum" sz="quarter" idx="10"/>
+          </p:nvPr>
+        </p:nvSpPr>
+        <p:spPr/>
+        <p:txBody>
+          <a:bodyPr/>
+          <a:lstStyle/>
+          <a:p>
+            <a:fld id="{EB39817A-1F4F-4EA4-BA15-F3F705A53923}" type="slidenum">
+              <a:rPr lang="pt-BR" smtClean="0"/>
+              <a:t>1</a:t>
+            </a:fld>
+            <a:endParaRPr lang="pt-BR"/>
+          </a:p>
+        </p:txBody>
+      </p:sp>
+    </p:spTree>
+    <p:extLst>
+      <p:ext uri="{BB962C8B-B14F-4D97-AF65-F5344CB8AC3E}">
+        <p14:creationId xmlns:p14="http://schemas.microsoft.com/office/powerpoint/2010/main" val="2713909536"/>
+      </p:ext>
+    </p:extLst>
+  </p:cSld>
+  <p:clrMapOvr>
+    <a:masterClrMapping/>
+  </p:clrMapOvr>
+</p:notes>
+</file>
+
 <file path=ppt/slideLayouts/slideLayout1.xml><?xml version="1.0" encoding="utf-8"?>
 <p:sldLayout xmlns:a="http://schemas.openxmlformats.org/drawingml/2006/main" xmlns:r="http://schemas.openxmlformats.org/officeDocument/2006/relationships" xmlns:p="http://schemas.openxmlformats.org/presentationml/2006/main" showMasterSp="0" type="title" preserve="1">
   <p:cSld name="Slide de Título">
@@ -351,7 +788,7 @@
           <a:bodyPr/>
           <a:lstStyle/>
           <a:p>
-            <a:fld id="{2A9E60B2-1E98-461F-ABAB-B833500A5E75}" type="datetimeFigureOut">
+            <a:fld id="{4946AE2E-34D5-48E8-A1C7-53AD1D04C142}" type="datetime1">
               <a:rPr lang="pt-BR" smtClean="0"/>
               <a:t>04/12/2019</a:t>
             </a:fld>
@@ -559,7 +996,7 @@
           <a:bodyPr/>
           <a:lstStyle/>
           <a:p>
-            <a:fld id="{2A9E60B2-1E98-461F-ABAB-B833500A5E75}" type="datetimeFigureOut">
+            <a:fld id="{559BEE3F-4479-4C2B-B45A-25513266C39D}" type="datetime1">
               <a:rPr lang="pt-BR" smtClean="0"/>
               <a:t>04/12/2019</a:t>
             </a:fld>
@@ -817,7 +1254,7 @@
           <a:bodyPr/>
           <a:lstStyle/>
           <a:p>
-            <a:fld id="{2A9E60B2-1E98-461F-ABAB-B833500A5E75}" type="datetimeFigureOut">
+            <a:fld id="{F6094E2E-91E8-4ADB-8A57-AFF4BB2D0BBC}" type="datetime1">
               <a:rPr lang="pt-BR" smtClean="0"/>
               <a:t>04/12/2019</a:t>
             </a:fld>
@@ -987,7 +1424,7 @@
           <a:bodyPr/>
           <a:lstStyle/>
           <a:p>
-            <a:fld id="{2A9E60B2-1E98-461F-ABAB-B833500A5E75}" type="datetimeFigureOut">
+            <a:fld id="{3F9B4B0F-BF8C-4A93-8462-BE9E20B47670}" type="datetime1">
               <a:rPr lang="pt-BR" smtClean="0"/>
               <a:t>04/12/2019</a:t>
             </a:fld>
@@ -1324,7 +1761,7 @@
           <a:bodyPr/>
           <a:lstStyle/>
           <a:p>
-            <a:fld id="{2A9E60B2-1E98-461F-ABAB-B833500A5E75}" type="datetimeFigureOut">
+            <a:fld id="{AFF8E081-BEBF-4AED-BD56-6C9604E2D4FF}" type="datetime1">
               <a:rPr lang="pt-BR" smtClean="0"/>
               <a:t>04/12/2019</a:t>
             </a:fld>
@@ -1599,7 +2036,7 @@
           <a:bodyPr/>
           <a:lstStyle/>
           <a:p>
-            <a:fld id="{2A9E60B2-1E98-461F-ABAB-B833500A5E75}" type="datetimeFigureOut">
+            <a:fld id="{F8DD0B15-23B8-4B23-B08B-C3473519830F}" type="datetime1">
               <a:rPr lang="pt-BR" smtClean="0"/>
               <a:t>04/12/2019</a:t>
             </a:fld>
@@ -1978,7 +2415,7 @@
           <a:bodyPr/>
           <a:lstStyle/>
           <a:p>
-            <a:fld id="{2A9E60B2-1E98-461F-ABAB-B833500A5E75}" type="datetimeFigureOut">
+            <a:fld id="{9262C570-9EE2-4072-B7E7-F76AD6DDECEE}" type="datetime1">
               <a:rPr lang="pt-BR" smtClean="0"/>
               <a:t>04/12/2019</a:t>
             </a:fld>
@@ -2096,7 +2533,7 @@
           <a:bodyPr/>
           <a:lstStyle/>
           <a:p>
-            <a:fld id="{2A9E60B2-1E98-461F-ABAB-B833500A5E75}" type="datetimeFigureOut">
+            <a:fld id="{19057EAA-CFA0-4AE4-8A87-97DE0DF72981}" type="datetime1">
               <a:rPr lang="pt-BR" smtClean="0"/>
               <a:t>04/12/2019</a:t>
             </a:fld>
@@ -2269,7 +2706,7 @@
           <a:bodyPr/>
           <a:lstStyle/>
           <a:p>
-            <a:fld id="{2A9E60B2-1E98-461F-ABAB-B833500A5E75}" type="datetimeFigureOut">
+            <a:fld id="{B53FF1BF-874E-4A1B-81FC-7B46EE5797D9}" type="datetime1">
               <a:rPr lang="pt-BR" smtClean="0"/>
               <a:t>04/12/2019</a:t>
             </a:fld>
@@ -2625,7 +3062,7 @@
             </a:lvl1pPr>
           </a:lstStyle>
           <a:p>
-            <a:fld id="{2A9E60B2-1E98-461F-ABAB-B833500A5E75}" type="datetimeFigureOut">
+            <a:fld id="{7E71FD33-9B67-4CE8-B8D5-8B80DF8DD538}" type="datetime1">
               <a:rPr lang="pt-BR" smtClean="0"/>
               <a:t>04/12/2019</a:t>
             </a:fld>
@@ -3004,7 +3441,7 @@
           <a:bodyPr/>
           <a:lstStyle/>
           <a:p>
-            <a:fld id="{2A9E60B2-1E98-461F-ABAB-B833500A5E75}" type="datetimeFigureOut">
+            <a:fld id="{B96F4150-C42F-4EAD-8EF4-32206755C4DB}" type="datetime1">
               <a:rPr lang="pt-BR" smtClean="0"/>
               <a:t>04/12/2019</a:t>
             </a:fld>
@@ -3293,7 +3730,7 @@
             </a:lvl1pPr>
           </a:lstStyle>
           <a:p>
-            <a:fld id="{2A9E60B2-1E98-461F-ABAB-B833500A5E75}" type="datetimeFigureOut">
+            <a:fld id="{9DA0CE7F-C2C3-4615-827C-6FE731511093}" type="datetime1">
               <a:rPr lang="pt-BR" smtClean="0"/>
               <a:t>04/12/2019</a:t>
             </a:fld>
@@ -3434,6 +3871,7 @@
     <p:sldLayoutId id="2147483748" r:id="rId10"/>
     <p:sldLayoutId id="2147483749" r:id="rId11"/>
   </p:sldLayoutIdLst>
+  <p:hf hdr="0" ftr="0" dt="0"/>
   <p:txStyles>
     <p:titleStyle>
       <a:lvl1pPr algn="l" defTabSz="914400" rtl="0" eaLnBrk="1" latinLnBrk="0" hangingPunct="1">
@@ -3832,7 +4270,7 @@
           <p:cNvPr id="7" name="Imagem 6">
             <a:extLst>
               <a:ext uri="{FF2B5EF4-FFF2-40B4-BE49-F238E27FC236}">
-                <a16:creationId xmlns:a16="http://schemas.microsoft.com/office/drawing/2014/main" xmlns="" id="{C59F64E0-879C-4B37-BF00-BC8C5CDCC482}"/>
+                <a16:creationId xmlns="" xmlns:a16="http://schemas.microsoft.com/office/drawing/2014/main" id="{C59F64E0-879C-4B37-BF00-BC8C5CDCC482}"/>
               </a:ext>
             </a:extLst>
           </p:cNvPr>
@@ -3842,7 +4280,7 @@
           <p:nvPr/>
         </p:nvPicPr>
         <p:blipFill rotWithShape="1">
-          <a:blip r:embed="rId2" cstate="print">
+          <a:blip r:embed="rId3" cstate="print">
             <a:extLst>
               <a:ext uri="{28A0092B-C50C-407E-A947-70E740481C1C}">
                 <a14:useLocalDpi xmlns:a14="http://schemas.microsoft.com/office/drawing/2010/main" val="0"/>
@@ -3862,6 +4300,29 @@
           </a:prstGeom>
         </p:spPr>
       </p:pic>
+      <p:sp>
+        <p:nvSpPr>
+          <p:cNvPr id="2" name="Espaço Reservado para Número de Slide 1"/>
+          <p:cNvSpPr>
+            <a:spLocks noGrp="1"/>
+          </p:cNvSpPr>
+          <p:nvPr>
+            <p:ph type="sldNum" sz="quarter" idx="12"/>
+          </p:nvPr>
+        </p:nvSpPr>
+        <p:spPr/>
+        <p:txBody>
+          <a:bodyPr/>
+          <a:lstStyle/>
+          <a:p>
+            <a:fld id="{7B24AB6A-A7E8-49A3-9DDE-B468C885D9DF}" type="slidenum">
+              <a:rPr lang="pt-BR" smtClean="0"/>
+              <a:t>1</a:t>
+            </a:fld>
+            <a:endParaRPr lang="pt-BR"/>
+          </a:p>
+        </p:txBody>
+      </p:sp>
     </p:spTree>
     <p:extLst>
       <p:ext uri="{BB962C8B-B14F-4D97-AF65-F5344CB8AC3E}">
@@ -3872,6 +4333,13 @@
   <p:clrMapOvr>
     <a:masterClrMapping/>
   </p:clrMapOvr>
+  <p:timing>
+    <p:tnLst>
+      <p:par>
+        <p:cTn id="1" dur="indefinite" restart="never" nodeType="tmRoot"/>
+      </p:par>
+    </p:tnLst>
+  </p:timing>
 </p:sld>
 </file>
 
@@ -3897,7 +4365,7 @@
           <p:cNvPr id="2" name="Título 1">
             <a:extLst>
               <a:ext uri="{FF2B5EF4-FFF2-40B4-BE49-F238E27FC236}">
-                <a16:creationId xmlns:a16="http://schemas.microsoft.com/office/drawing/2014/main" xmlns="" id="{8E20EB79-7171-47E0-ACDE-F4B858F89259}"/>
+                <a16:creationId xmlns="" xmlns:a16="http://schemas.microsoft.com/office/drawing/2014/main" id="{8E20EB79-7171-47E0-ACDE-F4B858F89259}"/>
               </a:ext>
             </a:extLst>
           </p:cNvPr>
@@ -3939,7 +4407,7 @@
           <p:cNvPr id="3" name="Espaço Reservado para Conteúdo 2">
             <a:extLst>
               <a:ext uri="{FF2B5EF4-FFF2-40B4-BE49-F238E27FC236}">
-                <a16:creationId xmlns:a16="http://schemas.microsoft.com/office/drawing/2014/main" xmlns="" id="{BB5DD53B-EBB0-4739-AA1A-977E1FE83896}"/>
+                <a16:creationId xmlns="" xmlns:a16="http://schemas.microsoft.com/office/drawing/2014/main" id="{BB5DD53B-EBB0-4739-AA1A-977E1FE83896}"/>
               </a:ext>
             </a:extLst>
           </p:cNvPr>
@@ -4016,20 +4484,14 @@
                 <a:latin typeface="Arial" panose="020B0604020202020204" pitchFamily="34" charset="0"/>
                 <a:cs typeface="Arial" panose="020B0604020202020204" pitchFamily="34" charset="0"/>
               </a:rPr>
-              <a:t>Padrão de detalhes</a:t>
-            </a:r>
-          </a:p>
-          <a:p>
-            <a:pPr lvl="1">
-              <a:buFont typeface="Wingdings" panose="05000000000000000000" pitchFamily="2" charset="2"/>
-              <a:buChar char="§"/>
-            </a:pPr>
+              <a:t>Padrão </a:t>
+            </a:r>
             <a:r>
               <a:rPr lang="pt-BR" sz="2800" dirty="0" smtClean="0">
                 <a:latin typeface="Arial" panose="020B0604020202020204" pitchFamily="34" charset="0"/>
                 <a:cs typeface="Arial" panose="020B0604020202020204" pitchFamily="34" charset="0"/>
               </a:rPr>
-              <a:t>Padrão de cores</a:t>
+              <a:t>de cores</a:t>
             </a:r>
           </a:p>
           <a:p>
@@ -4075,7 +4537,7 @@
           <p:cNvPr id="5" name="Imagem 4">
             <a:extLst>
               <a:ext uri="{FF2B5EF4-FFF2-40B4-BE49-F238E27FC236}">
-                <a16:creationId xmlns:a16="http://schemas.microsoft.com/office/drawing/2014/main" xmlns="" id="{5C821069-0DB8-489A-B78E-11B18B2FFCAF}"/>
+                <a16:creationId xmlns="" xmlns:a16="http://schemas.microsoft.com/office/drawing/2014/main" id="{5C821069-0DB8-489A-B78E-11B18B2FFCAF}"/>
               </a:ext>
             </a:extLst>
           </p:cNvPr>
@@ -4106,6 +4568,29 @@
           </a:prstGeom>
         </p:spPr>
       </p:pic>
+      <p:sp>
+        <p:nvSpPr>
+          <p:cNvPr id="4" name="Espaço Reservado para Número de Slide 3"/>
+          <p:cNvSpPr>
+            <a:spLocks noGrp="1"/>
+          </p:cNvSpPr>
+          <p:nvPr>
+            <p:ph type="sldNum" sz="quarter" idx="12"/>
+          </p:nvPr>
+        </p:nvSpPr>
+        <p:spPr/>
+        <p:txBody>
+          <a:bodyPr/>
+          <a:lstStyle/>
+          <a:p>
+            <a:fld id="{7B24AB6A-A7E8-49A3-9DDE-B468C885D9DF}" type="slidenum">
+              <a:rPr lang="pt-BR" smtClean="0"/>
+              <a:t>10</a:t>
+            </a:fld>
+            <a:endParaRPr lang="pt-BR"/>
+          </a:p>
+        </p:txBody>
+      </p:sp>
     </p:spTree>
     <p:extLst>
       <p:ext uri="{BB962C8B-B14F-4D97-AF65-F5344CB8AC3E}">
@@ -4116,6 +4601,13 @@
   <p:clrMapOvr>
     <a:masterClrMapping/>
   </p:clrMapOvr>
+  <p:timing>
+    <p:tnLst>
+      <p:par>
+        <p:cTn id="1" dur="indefinite" restart="never" nodeType="tmRoot"/>
+      </p:par>
+    </p:tnLst>
+  </p:timing>
 </p:sld>
 </file>
 
@@ -4141,7 +4633,7 @@
           <p:cNvPr id="2" name="Imagem 1">
             <a:extLst>
               <a:ext uri="{FF2B5EF4-FFF2-40B4-BE49-F238E27FC236}">
-                <a16:creationId xmlns:a16="http://schemas.microsoft.com/office/drawing/2014/main" xmlns="" id="{5C821069-0DB8-489A-B78E-11B18B2FFCAF}"/>
+                <a16:creationId xmlns="" xmlns:a16="http://schemas.microsoft.com/office/drawing/2014/main" id="{5C821069-0DB8-489A-B78E-11B18B2FFCAF}"/>
               </a:ext>
             </a:extLst>
           </p:cNvPr>
@@ -4177,7 +4669,7 @@
           <p:cNvPr id="3" name="Título 1">
             <a:extLst>
               <a:ext uri="{FF2B5EF4-FFF2-40B4-BE49-F238E27FC236}">
-                <a16:creationId xmlns:a16="http://schemas.microsoft.com/office/drawing/2014/main" xmlns="" id="{8E20EB79-7171-47E0-ACDE-F4B858F89259}"/>
+                <a16:creationId xmlns="" xmlns:a16="http://schemas.microsoft.com/office/drawing/2014/main" id="{8E20EB79-7171-47E0-ACDE-F4B858F89259}"/>
               </a:ext>
             </a:extLst>
           </p:cNvPr>
@@ -4236,6 +4728,29 @@
           </a:p>
         </p:txBody>
       </p:sp>
+      <p:sp>
+        <p:nvSpPr>
+          <p:cNvPr id="4" name="Espaço Reservado para Número de Slide 3"/>
+          <p:cNvSpPr>
+            <a:spLocks noGrp="1"/>
+          </p:cNvSpPr>
+          <p:nvPr>
+            <p:ph type="sldNum" sz="quarter" idx="12"/>
+          </p:nvPr>
+        </p:nvSpPr>
+        <p:spPr/>
+        <p:txBody>
+          <a:bodyPr/>
+          <a:lstStyle/>
+          <a:p>
+            <a:fld id="{7B24AB6A-A7E8-49A3-9DDE-B468C885D9DF}" type="slidenum">
+              <a:rPr lang="pt-BR" smtClean="0"/>
+              <a:t>11</a:t>
+            </a:fld>
+            <a:endParaRPr lang="pt-BR"/>
+          </a:p>
+        </p:txBody>
+      </p:sp>
     </p:spTree>
     <p:extLst>
       <p:ext uri="{BB962C8B-B14F-4D97-AF65-F5344CB8AC3E}">
@@ -4246,6 +4761,13 @@
   <p:clrMapOvr>
     <a:masterClrMapping/>
   </p:clrMapOvr>
+  <p:timing>
+    <p:tnLst>
+      <p:par>
+        <p:cTn id="1" dur="indefinite" restart="never" nodeType="tmRoot"/>
+      </p:par>
+    </p:tnLst>
+  </p:timing>
 </p:sld>
 </file>
 
@@ -4271,7 +4793,7 @@
           <p:cNvPr id="2" name="Título 1">
             <a:extLst>
               <a:ext uri="{FF2B5EF4-FFF2-40B4-BE49-F238E27FC236}">
-                <a16:creationId xmlns:a16="http://schemas.microsoft.com/office/drawing/2014/main" xmlns="" id="{8E20EB79-7171-47E0-ACDE-F4B858F89259}"/>
+                <a16:creationId xmlns="" xmlns:a16="http://schemas.microsoft.com/office/drawing/2014/main" id="{8E20EB79-7171-47E0-ACDE-F4B858F89259}"/>
               </a:ext>
             </a:extLst>
           </p:cNvPr>
@@ -4313,7 +4835,7 @@
           <p:cNvPr id="3" name="Espaço Reservado para Conteúdo 2">
             <a:extLst>
               <a:ext uri="{FF2B5EF4-FFF2-40B4-BE49-F238E27FC236}">
-                <a16:creationId xmlns:a16="http://schemas.microsoft.com/office/drawing/2014/main" xmlns="" id="{BB5DD53B-EBB0-4739-AA1A-977E1FE83896}"/>
+                <a16:creationId xmlns="" xmlns:a16="http://schemas.microsoft.com/office/drawing/2014/main" id="{BB5DD53B-EBB0-4739-AA1A-977E1FE83896}"/>
               </a:ext>
             </a:extLst>
           </p:cNvPr>
@@ -4384,7 +4906,7 @@
           <p:cNvPr id="5" name="Imagem 4">
             <a:extLst>
               <a:ext uri="{FF2B5EF4-FFF2-40B4-BE49-F238E27FC236}">
-                <a16:creationId xmlns:a16="http://schemas.microsoft.com/office/drawing/2014/main" xmlns="" id="{5C821069-0DB8-489A-B78E-11B18B2FFCAF}"/>
+                <a16:creationId xmlns="" xmlns:a16="http://schemas.microsoft.com/office/drawing/2014/main" id="{5C821069-0DB8-489A-B78E-11B18B2FFCAF}"/>
               </a:ext>
             </a:extLst>
           </p:cNvPr>
@@ -4420,7 +4942,7 @@
           <p:cNvPr id="6" name="Espaço Reservado para Conteúdo 2">
             <a:extLst>
               <a:ext uri="{FF2B5EF4-FFF2-40B4-BE49-F238E27FC236}">
-                <a16:creationId xmlns:a16="http://schemas.microsoft.com/office/drawing/2014/main" xmlns="" id="{BB5DD53B-EBB0-4739-AA1A-977E1FE83896}"/>
+                <a16:creationId xmlns="" xmlns:a16="http://schemas.microsoft.com/office/drawing/2014/main" id="{BB5DD53B-EBB0-4739-AA1A-977E1FE83896}"/>
               </a:ext>
             </a:extLst>
           </p:cNvPr>
@@ -4784,7 +5306,7 @@
           <p:cNvPr id="7" name="Espaço Reservado para Conteúdo 2">
             <a:extLst>
               <a:ext uri="{FF2B5EF4-FFF2-40B4-BE49-F238E27FC236}">
-                <a16:creationId xmlns:a16="http://schemas.microsoft.com/office/drawing/2014/main" xmlns="" id="{BB5DD53B-EBB0-4739-AA1A-977E1FE83896}"/>
+                <a16:creationId xmlns="" xmlns:a16="http://schemas.microsoft.com/office/drawing/2014/main" id="{BB5DD53B-EBB0-4739-AA1A-977E1FE83896}"/>
               </a:ext>
             </a:extLst>
           </p:cNvPr>
@@ -5199,6 +5721,29 @@
           </a:prstGeom>
         </p:spPr>
       </p:pic>
+      <p:sp>
+        <p:nvSpPr>
+          <p:cNvPr id="10" name="Espaço Reservado para Número de Slide 9"/>
+          <p:cNvSpPr>
+            <a:spLocks noGrp="1"/>
+          </p:cNvSpPr>
+          <p:nvPr>
+            <p:ph type="sldNum" sz="quarter" idx="12"/>
+          </p:nvPr>
+        </p:nvSpPr>
+        <p:spPr/>
+        <p:txBody>
+          <a:bodyPr/>
+          <a:lstStyle/>
+          <a:p>
+            <a:fld id="{7B24AB6A-A7E8-49A3-9DDE-B468C885D9DF}" type="slidenum">
+              <a:rPr lang="pt-BR" smtClean="0"/>
+              <a:t>12</a:t>
+            </a:fld>
+            <a:endParaRPr lang="pt-BR"/>
+          </a:p>
+        </p:txBody>
+      </p:sp>
     </p:spTree>
     <p:extLst>
       <p:ext uri="{BB962C8B-B14F-4D97-AF65-F5344CB8AC3E}">
@@ -5209,6 +5754,13 @@
   <p:clrMapOvr>
     <a:masterClrMapping/>
   </p:clrMapOvr>
+  <p:timing>
+    <p:tnLst>
+      <p:par>
+        <p:cTn id="1" dur="indefinite" restart="never" nodeType="tmRoot"/>
+      </p:par>
+    </p:tnLst>
+  </p:timing>
 </p:sld>
 </file>
 
@@ -5234,7 +5786,7 @@
           <p:cNvPr id="2" name="Imagem 1">
             <a:extLst>
               <a:ext uri="{FF2B5EF4-FFF2-40B4-BE49-F238E27FC236}">
-                <a16:creationId xmlns:a16="http://schemas.microsoft.com/office/drawing/2014/main" xmlns="" id="{5C821069-0DB8-489A-B78E-11B18B2FFCAF}"/>
+                <a16:creationId xmlns="" xmlns:a16="http://schemas.microsoft.com/office/drawing/2014/main" id="{5C821069-0DB8-489A-B78E-11B18B2FFCAF}"/>
               </a:ext>
             </a:extLst>
           </p:cNvPr>
@@ -5270,7 +5822,7 @@
           <p:cNvPr id="4" name="Espaço Reservado para Conteúdo 2">
             <a:extLst>
               <a:ext uri="{FF2B5EF4-FFF2-40B4-BE49-F238E27FC236}">
-                <a16:creationId xmlns:a16="http://schemas.microsoft.com/office/drawing/2014/main" xmlns="" id="{BB5DD53B-EBB0-4739-AA1A-977E1FE83896}"/>
+                <a16:creationId xmlns="" xmlns:a16="http://schemas.microsoft.com/office/drawing/2014/main" id="{BB5DD53B-EBB0-4739-AA1A-977E1FE83896}"/>
               </a:ext>
             </a:extLst>
           </p:cNvPr>
@@ -5696,6 +6248,29 @@
           </a:p>
         </p:txBody>
       </p:sp>
+      <p:sp>
+        <p:nvSpPr>
+          <p:cNvPr id="3" name="Espaço Reservado para Número de Slide 2"/>
+          <p:cNvSpPr>
+            <a:spLocks noGrp="1"/>
+          </p:cNvSpPr>
+          <p:nvPr>
+            <p:ph type="sldNum" sz="quarter" idx="12"/>
+          </p:nvPr>
+        </p:nvSpPr>
+        <p:spPr/>
+        <p:txBody>
+          <a:bodyPr/>
+          <a:lstStyle/>
+          <a:p>
+            <a:fld id="{7B24AB6A-A7E8-49A3-9DDE-B468C885D9DF}" type="slidenum">
+              <a:rPr lang="pt-BR" smtClean="0"/>
+              <a:t>13</a:t>
+            </a:fld>
+            <a:endParaRPr lang="pt-BR"/>
+          </a:p>
+        </p:txBody>
+      </p:sp>
     </p:spTree>
     <p:extLst>
       <p:ext uri="{BB962C8B-B14F-4D97-AF65-F5344CB8AC3E}">
@@ -5706,6 +6281,13 @@
   <p:clrMapOvr>
     <a:masterClrMapping/>
   </p:clrMapOvr>
+  <p:timing>
+    <p:tnLst>
+      <p:par>
+        <p:cTn id="1" dur="indefinite" restart="never" nodeType="tmRoot"/>
+      </p:par>
+    </p:tnLst>
+  </p:timing>
 </p:sld>
 </file>
 
@@ -5739,7 +6321,7 @@
           <p:cNvPr id="7" name="Imagem 6">
             <a:extLst>
               <a:ext uri="{FF2B5EF4-FFF2-40B4-BE49-F238E27FC236}">
-                <a16:creationId xmlns:a16="http://schemas.microsoft.com/office/drawing/2014/main" xmlns="" id="{C59F64E0-879C-4B37-BF00-BC8C5CDCC482}"/>
+                <a16:creationId xmlns="" xmlns:a16="http://schemas.microsoft.com/office/drawing/2014/main" id="{C59F64E0-879C-4B37-BF00-BC8C5CDCC482}"/>
               </a:ext>
             </a:extLst>
           </p:cNvPr>
@@ -5769,6 +6351,29 @@
           </a:prstGeom>
         </p:spPr>
       </p:pic>
+      <p:sp>
+        <p:nvSpPr>
+          <p:cNvPr id="2" name="Espaço Reservado para Número de Slide 1"/>
+          <p:cNvSpPr>
+            <a:spLocks noGrp="1"/>
+          </p:cNvSpPr>
+          <p:nvPr>
+            <p:ph type="sldNum" sz="quarter" idx="12"/>
+          </p:nvPr>
+        </p:nvSpPr>
+        <p:spPr/>
+        <p:txBody>
+          <a:bodyPr/>
+          <a:lstStyle/>
+          <a:p>
+            <a:fld id="{7B24AB6A-A7E8-49A3-9DDE-B468C885D9DF}" type="slidenum">
+              <a:rPr lang="pt-BR" smtClean="0"/>
+              <a:t>14</a:t>
+            </a:fld>
+            <a:endParaRPr lang="pt-BR"/>
+          </a:p>
+        </p:txBody>
+      </p:sp>
     </p:spTree>
     <p:extLst>
       <p:ext uri="{BB962C8B-B14F-4D97-AF65-F5344CB8AC3E}">
@@ -5779,6 +6384,13 @@
   <p:clrMapOvr>
     <a:masterClrMapping/>
   </p:clrMapOvr>
+  <p:timing>
+    <p:tnLst>
+      <p:par>
+        <p:cTn id="1" dur="indefinite" restart="never" nodeType="tmRoot"/>
+      </p:par>
+    </p:tnLst>
+  </p:timing>
 </p:sld>
 </file>
 
@@ -5804,7 +6416,7 @@
           <p:cNvPr id="2" name="Título 1">
             <a:extLst>
               <a:ext uri="{FF2B5EF4-FFF2-40B4-BE49-F238E27FC236}">
-                <a16:creationId xmlns:a16="http://schemas.microsoft.com/office/drawing/2014/main" xmlns="" id="{8E20EB79-7171-47E0-ACDE-F4B858F89259}"/>
+                <a16:creationId xmlns="" xmlns:a16="http://schemas.microsoft.com/office/drawing/2014/main" id="{8E20EB79-7171-47E0-ACDE-F4B858F89259}"/>
               </a:ext>
             </a:extLst>
           </p:cNvPr>
@@ -5853,7 +6465,7 @@
           <p:cNvPr id="3" name="Espaço Reservado para Conteúdo 2">
             <a:extLst>
               <a:ext uri="{FF2B5EF4-FFF2-40B4-BE49-F238E27FC236}">
-                <a16:creationId xmlns:a16="http://schemas.microsoft.com/office/drawing/2014/main" xmlns="" id="{BB5DD53B-EBB0-4739-AA1A-977E1FE83896}"/>
+                <a16:creationId xmlns="" xmlns:a16="http://schemas.microsoft.com/office/drawing/2014/main" id="{BB5DD53B-EBB0-4739-AA1A-977E1FE83896}"/>
               </a:ext>
             </a:extLst>
           </p:cNvPr>
@@ -5970,6 +6582,29 @@
           </a:prstGeom>
         </p:spPr>
       </p:pic>
+      <p:sp>
+        <p:nvSpPr>
+          <p:cNvPr id="5" name="Espaço Reservado para Número de Slide 4"/>
+          <p:cNvSpPr>
+            <a:spLocks noGrp="1"/>
+          </p:cNvSpPr>
+          <p:nvPr>
+            <p:ph type="sldNum" sz="quarter" idx="12"/>
+          </p:nvPr>
+        </p:nvSpPr>
+        <p:spPr/>
+        <p:txBody>
+          <a:bodyPr/>
+          <a:lstStyle/>
+          <a:p>
+            <a:fld id="{7B24AB6A-A7E8-49A3-9DDE-B468C885D9DF}" type="slidenum">
+              <a:rPr lang="pt-BR" smtClean="0"/>
+              <a:t>2</a:t>
+            </a:fld>
+            <a:endParaRPr lang="pt-BR"/>
+          </a:p>
+        </p:txBody>
+      </p:sp>
     </p:spTree>
     <p:extLst>
       <p:ext uri="{BB962C8B-B14F-4D97-AF65-F5344CB8AC3E}">
@@ -5980,6 +6615,13 @@
   <p:clrMapOvr>
     <a:masterClrMapping/>
   </p:clrMapOvr>
+  <p:timing>
+    <p:tnLst>
+      <p:par>
+        <p:cTn id="1" dur="indefinite" restart="never" nodeType="tmRoot"/>
+      </p:par>
+    </p:tnLst>
+  </p:timing>
 </p:sld>
 </file>
 
@@ -6005,7 +6647,7 @@
           <p:cNvPr id="2" name="Título 1">
             <a:extLst>
               <a:ext uri="{FF2B5EF4-FFF2-40B4-BE49-F238E27FC236}">
-                <a16:creationId xmlns:a16="http://schemas.microsoft.com/office/drawing/2014/main" xmlns="" id="{8E20EB79-7171-47E0-ACDE-F4B858F89259}"/>
+                <a16:creationId xmlns="" xmlns:a16="http://schemas.microsoft.com/office/drawing/2014/main" id="{8E20EB79-7171-47E0-ACDE-F4B858F89259}"/>
               </a:ext>
             </a:extLst>
           </p:cNvPr>
@@ -6047,7 +6689,7 @@
           <p:cNvPr id="3" name="Espaço Reservado para Conteúdo 2">
             <a:extLst>
               <a:ext uri="{FF2B5EF4-FFF2-40B4-BE49-F238E27FC236}">
-                <a16:creationId xmlns:a16="http://schemas.microsoft.com/office/drawing/2014/main" xmlns="" id="{BB5DD53B-EBB0-4739-AA1A-977E1FE83896}"/>
+                <a16:creationId xmlns="" xmlns:a16="http://schemas.microsoft.com/office/drawing/2014/main" id="{BB5DD53B-EBB0-4739-AA1A-977E1FE83896}"/>
               </a:ext>
             </a:extLst>
           </p:cNvPr>
@@ -6174,7 +6816,7 @@
           <p:cNvPr id="5" name="Imagem 4">
             <a:extLst>
               <a:ext uri="{FF2B5EF4-FFF2-40B4-BE49-F238E27FC236}">
-                <a16:creationId xmlns:a16="http://schemas.microsoft.com/office/drawing/2014/main" xmlns="" id="{5C821069-0DB8-489A-B78E-11B18B2FFCAF}"/>
+                <a16:creationId xmlns="" xmlns:a16="http://schemas.microsoft.com/office/drawing/2014/main" id="{5C821069-0DB8-489A-B78E-11B18B2FFCAF}"/>
               </a:ext>
             </a:extLst>
           </p:cNvPr>
@@ -6205,6 +6847,29 @@
           </a:prstGeom>
         </p:spPr>
       </p:pic>
+      <p:sp>
+        <p:nvSpPr>
+          <p:cNvPr id="4" name="Espaço Reservado para Número de Slide 3"/>
+          <p:cNvSpPr>
+            <a:spLocks noGrp="1"/>
+          </p:cNvSpPr>
+          <p:nvPr>
+            <p:ph type="sldNum" sz="quarter" idx="12"/>
+          </p:nvPr>
+        </p:nvSpPr>
+        <p:spPr/>
+        <p:txBody>
+          <a:bodyPr/>
+          <a:lstStyle/>
+          <a:p>
+            <a:fld id="{7B24AB6A-A7E8-49A3-9DDE-B468C885D9DF}" type="slidenum">
+              <a:rPr lang="pt-BR" smtClean="0"/>
+              <a:t>3</a:t>
+            </a:fld>
+            <a:endParaRPr lang="pt-BR"/>
+          </a:p>
+        </p:txBody>
+      </p:sp>
     </p:spTree>
     <p:extLst>
       <p:ext uri="{BB962C8B-B14F-4D97-AF65-F5344CB8AC3E}">
@@ -6215,6 +6880,13 @@
   <p:clrMapOvr>
     <a:masterClrMapping/>
   </p:clrMapOvr>
+  <p:timing>
+    <p:tnLst>
+      <p:par>
+        <p:cTn id="1" dur="indefinite" restart="never" nodeType="tmRoot"/>
+      </p:par>
+    </p:tnLst>
+  </p:timing>
 </p:sld>
 </file>
 
@@ -6240,7 +6912,7 @@
           <p:cNvPr id="2" name="Título 1">
             <a:extLst>
               <a:ext uri="{FF2B5EF4-FFF2-40B4-BE49-F238E27FC236}">
-                <a16:creationId xmlns:a16="http://schemas.microsoft.com/office/drawing/2014/main" xmlns="" id="{8E20EB79-7171-47E0-ACDE-F4B858F89259}"/>
+                <a16:creationId xmlns="" xmlns:a16="http://schemas.microsoft.com/office/drawing/2014/main" id="{8E20EB79-7171-47E0-ACDE-F4B858F89259}"/>
               </a:ext>
             </a:extLst>
           </p:cNvPr>
@@ -6282,7 +6954,7 @@
           <p:cNvPr id="3" name="Espaço Reservado para Conteúdo 2">
             <a:extLst>
               <a:ext uri="{FF2B5EF4-FFF2-40B4-BE49-F238E27FC236}">
-                <a16:creationId xmlns:a16="http://schemas.microsoft.com/office/drawing/2014/main" xmlns="" id="{BB5DD53B-EBB0-4739-AA1A-977E1FE83896}"/>
+                <a16:creationId xmlns="" xmlns:a16="http://schemas.microsoft.com/office/drawing/2014/main" id="{BB5DD53B-EBB0-4739-AA1A-977E1FE83896}"/>
               </a:ext>
             </a:extLst>
           </p:cNvPr>
@@ -6383,7 +7055,7 @@
           <p:cNvPr id="5" name="Imagem 4">
             <a:extLst>
               <a:ext uri="{FF2B5EF4-FFF2-40B4-BE49-F238E27FC236}">
-                <a16:creationId xmlns:a16="http://schemas.microsoft.com/office/drawing/2014/main" xmlns="" id="{5C821069-0DB8-489A-B78E-11B18B2FFCAF}"/>
+                <a16:creationId xmlns="" xmlns:a16="http://schemas.microsoft.com/office/drawing/2014/main" id="{5C821069-0DB8-489A-B78E-11B18B2FFCAF}"/>
               </a:ext>
             </a:extLst>
           </p:cNvPr>
@@ -6414,6 +7086,29 @@
           </a:prstGeom>
         </p:spPr>
       </p:pic>
+      <p:sp>
+        <p:nvSpPr>
+          <p:cNvPr id="4" name="Espaço Reservado para Número de Slide 3"/>
+          <p:cNvSpPr>
+            <a:spLocks noGrp="1"/>
+          </p:cNvSpPr>
+          <p:nvPr>
+            <p:ph type="sldNum" sz="quarter" idx="12"/>
+          </p:nvPr>
+        </p:nvSpPr>
+        <p:spPr/>
+        <p:txBody>
+          <a:bodyPr/>
+          <a:lstStyle/>
+          <a:p>
+            <a:fld id="{7B24AB6A-A7E8-49A3-9DDE-B468C885D9DF}" type="slidenum">
+              <a:rPr lang="pt-BR" smtClean="0"/>
+              <a:t>4</a:t>
+            </a:fld>
+            <a:endParaRPr lang="pt-BR"/>
+          </a:p>
+        </p:txBody>
+      </p:sp>
     </p:spTree>
     <p:extLst>
       <p:ext uri="{BB962C8B-B14F-4D97-AF65-F5344CB8AC3E}">
@@ -6424,6 +7119,13 @@
   <p:clrMapOvr>
     <a:masterClrMapping/>
   </p:clrMapOvr>
+  <p:timing>
+    <p:tnLst>
+      <p:par>
+        <p:cTn id="1" dur="indefinite" restart="never" nodeType="tmRoot"/>
+      </p:par>
+    </p:tnLst>
+  </p:timing>
 </p:sld>
 </file>
 
@@ -6449,7 +7151,7 @@
           <p:cNvPr id="2" name="Título 1">
             <a:extLst>
               <a:ext uri="{FF2B5EF4-FFF2-40B4-BE49-F238E27FC236}">
-                <a16:creationId xmlns:a16="http://schemas.microsoft.com/office/drawing/2014/main" xmlns="" id="{8E20EB79-7171-47E0-ACDE-F4B858F89259}"/>
+                <a16:creationId xmlns="" xmlns:a16="http://schemas.microsoft.com/office/drawing/2014/main" id="{8E20EB79-7171-47E0-ACDE-F4B858F89259}"/>
               </a:ext>
             </a:extLst>
           </p:cNvPr>
@@ -6491,7 +7193,7 @@
           <p:cNvPr id="3" name="Espaço Reservado para Conteúdo 2">
             <a:extLst>
               <a:ext uri="{FF2B5EF4-FFF2-40B4-BE49-F238E27FC236}">
-                <a16:creationId xmlns:a16="http://schemas.microsoft.com/office/drawing/2014/main" xmlns="" id="{BB5DD53B-EBB0-4739-AA1A-977E1FE83896}"/>
+                <a16:creationId xmlns="" xmlns:a16="http://schemas.microsoft.com/office/drawing/2014/main" id="{BB5DD53B-EBB0-4739-AA1A-977E1FE83896}"/>
               </a:ext>
             </a:extLst>
           </p:cNvPr>
@@ -6529,8 +7231,33 @@
                 <a:latin typeface="Arial" panose="020B0604020202020204" pitchFamily="34" charset="0"/>
                 <a:cs typeface="Arial" panose="020B0604020202020204" pitchFamily="34" charset="0"/>
               </a:rPr>
-              <a:t>Buscar a solução do problema, padronizando as ofertas de serviços; reunir informações e avaliações dos clientes e empresas.</a:t>
-            </a:r>
+              <a:t>Buscar a solução do problema, padronizando as ofertas de serviços; </a:t>
+            </a:r>
+            <a:r>
+              <a:rPr lang="pt-BR" sz="2800" dirty="0" smtClean="0">
+                <a:latin typeface="Arial" panose="020B0604020202020204" pitchFamily="34" charset="0"/>
+                <a:cs typeface="Arial" panose="020B0604020202020204" pitchFamily="34" charset="0"/>
+              </a:rPr>
+              <a:t>reunindo </a:t>
+            </a:r>
+            <a:r>
+              <a:rPr lang="pt-BR" sz="2800" dirty="0" smtClean="0">
+                <a:latin typeface="Arial" panose="020B0604020202020204" pitchFamily="34" charset="0"/>
+                <a:cs typeface="Arial" panose="020B0604020202020204" pitchFamily="34" charset="0"/>
+              </a:rPr>
+              <a:t>informações e avaliações dos clientes e </a:t>
+            </a:r>
+            <a:r>
+              <a:rPr lang="pt-BR" sz="2800" dirty="0" smtClean="0">
+                <a:latin typeface="Arial" panose="020B0604020202020204" pitchFamily="34" charset="0"/>
+                <a:cs typeface="Arial" panose="020B0604020202020204" pitchFamily="34" charset="0"/>
+              </a:rPr>
+              <a:t>empresas</a:t>
+            </a:r>
+            <a:endParaRPr lang="pt-BR" sz="2800" dirty="0" smtClean="0">
+              <a:latin typeface="Arial" panose="020B0604020202020204" pitchFamily="34" charset="0"/>
+              <a:cs typeface="Arial" panose="020B0604020202020204" pitchFamily="34" charset="0"/>
+            </a:endParaRPr>
           </a:p>
           <a:p>
             <a:pPr marL="0" indent="0">
@@ -6566,7 +7293,7 @@
           <p:cNvPr id="5" name="Imagem 4">
             <a:extLst>
               <a:ext uri="{FF2B5EF4-FFF2-40B4-BE49-F238E27FC236}">
-                <a16:creationId xmlns:a16="http://schemas.microsoft.com/office/drawing/2014/main" xmlns="" id="{5C821069-0DB8-489A-B78E-11B18B2FFCAF}"/>
+                <a16:creationId xmlns="" xmlns:a16="http://schemas.microsoft.com/office/drawing/2014/main" id="{5C821069-0DB8-489A-B78E-11B18B2FFCAF}"/>
               </a:ext>
             </a:extLst>
           </p:cNvPr>
@@ -6597,6 +7324,29 @@
           </a:prstGeom>
         </p:spPr>
       </p:pic>
+      <p:sp>
+        <p:nvSpPr>
+          <p:cNvPr id="4" name="Espaço Reservado para Número de Slide 3"/>
+          <p:cNvSpPr>
+            <a:spLocks noGrp="1"/>
+          </p:cNvSpPr>
+          <p:nvPr>
+            <p:ph type="sldNum" sz="quarter" idx="12"/>
+          </p:nvPr>
+        </p:nvSpPr>
+        <p:spPr/>
+        <p:txBody>
+          <a:bodyPr/>
+          <a:lstStyle/>
+          <a:p>
+            <a:fld id="{7B24AB6A-A7E8-49A3-9DDE-B468C885D9DF}" type="slidenum">
+              <a:rPr lang="pt-BR" smtClean="0"/>
+              <a:t>5</a:t>
+            </a:fld>
+            <a:endParaRPr lang="pt-BR"/>
+          </a:p>
+        </p:txBody>
+      </p:sp>
     </p:spTree>
     <p:extLst>
       <p:ext uri="{BB962C8B-B14F-4D97-AF65-F5344CB8AC3E}">
@@ -6607,6 +7357,13 @@
   <p:clrMapOvr>
     <a:masterClrMapping/>
   </p:clrMapOvr>
+  <p:timing>
+    <p:tnLst>
+      <p:par>
+        <p:cTn id="1" dur="indefinite" restart="never" nodeType="tmRoot"/>
+      </p:par>
+    </p:tnLst>
+  </p:timing>
 </p:sld>
 </file>
 
@@ -6632,7 +7389,7 @@
           <p:cNvPr id="2" name="Título 1">
             <a:extLst>
               <a:ext uri="{FF2B5EF4-FFF2-40B4-BE49-F238E27FC236}">
-                <a16:creationId xmlns:a16="http://schemas.microsoft.com/office/drawing/2014/main" xmlns="" id="{8E20EB79-7171-47E0-ACDE-F4B858F89259}"/>
+                <a16:creationId xmlns="" xmlns:a16="http://schemas.microsoft.com/office/drawing/2014/main" id="{8E20EB79-7171-47E0-ACDE-F4B858F89259}"/>
               </a:ext>
             </a:extLst>
           </p:cNvPr>
@@ -6674,7 +7431,7 @@
           <p:cNvPr id="3" name="Espaço Reservado para Conteúdo 2">
             <a:extLst>
               <a:ext uri="{FF2B5EF4-FFF2-40B4-BE49-F238E27FC236}">
-                <a16:creationId xmlns:a16="http://schemas.microsoft.com/office/drawing/2014/main" xmlns="" id="{BB5DD53B-EBB0-4739-AA1A-977E1FE83896}"/>
+                <a16:creationId xmlns="" xmlns:a16="http://schemas.microsoft.com/office/drawing/2014/main" id="{BB5DD53B-EBB0-4739-AA1A-977E1FE83896}"/>
               </a:ext>
             </a:extLst>
           </p:cNvPr>
@@ -6749,7 +7506,7 @@
           <p:cNvPr id="5" name="Imagem 4">
             <a:extLst>
               <a:ext uri="{FF2B5EF4-FFF2-40B4-BE49-F238E27FC236}">
-                <a16:creationId xmlns:a16="http://schemas.microsoft.com/office/drawing/2014/main" xmlns="" id="{5C821069-0DB8-489A-B78E-11B18B2FFCAF}"/>
+                <a16:creationId xmlns="" xmlns:a16="http://schemas.microsoft.com/office/drawing/2014/main" id="{5C821069-0DB8-489A-B78E-11B18B2FFCAF}"/>
               </a:ext>
             </a:extLst>
           </p:cNvPr>
@@ -6780,6 +7537,29 @@
           </a:prstGeom>
         </p:spPr>
       </p:pic>
+      <p:sp>
+        <p:nvSpPr>
+          <p:cNvPr id="4" name="Espaço Reservado para Número de Slide 3"/>
+          <p:cNvSpPr>
+            <a:spLocks noGrp="1"/>
+          </p:cNvSpPr>
+          <p:nvPr>
+            <p:ph type="sldNum" sz="quarter" idx="12"/>
+          </p:nvPr>
+        </p:nvSpPr>
+        <p:spPr/>
+        <p:txBody>
+          <a:bodyPr/>
+          <a:lstStyle/>
+          <a:p>
+            <a:fld id="{7B24AB6A-A7E8-49A3-9DDE-B468C885D9DF}" type="slidenum">
+              <a:rPr lang="pt-BR" smtClean="0"/>
+              <a:t>6</a:t>
+            </a:fld>
+            <a:endParaRPr lang="pt-BR"/>
+          </a:p>
+        </p:txBody>
+      </p:sp>
     </p:spTree>
     <p:extLst>
       <p:ext uri="{BB962C8B-B14F-4D97-AF65-F5344CB8AC3E}">
@@ -6790,6 +7570,13 @@
   <p:clrMapOvr>
     <a:masterClrMapping/>
   </p:clrMapOvr>
+  <p:timing>
+    <p:tnLst>
+      <p:par>
+        <p:cTn id="1" dur="indefinite" restart="never" nodeType="tmRoot"/>
+      </p:par>
+    </p:tnLst>
+  </p:timing>
 </p:sld>
 </file>
 
@@ -6815,7 +7602,7 @@
           <p:cNvPr id="2" name="Título 1">
             <a:extLst>
               <a:ext uri="{FF2B5EF4-FFF2-40B4-BE49-F238E27FC236}">
-                <a16:creationId xmlns:a16="http://schemas.microsoft.com/office/drawing/2014/main" xmlns="" id="{8E20EB79-7171-47E0-ACDE-F4B858F89259}"/>
+                <a16:creationId xmlns="" xmlns:a16="http://schemas.microsoft.com/office/drawing/2014/main" id="{8E20EB79-7171-47E0-ACDE-F4B858F89259}"/>
               </a:ext>
             </a:extLst>
           </p:cNvPr>
@@ -6857,7 +7644,7 @@
           <p:cNvPr id="3" name="Espaço Reservado para Conteúdo 2">
             <a:extLst>
               <a:ext uri="{FF2B5EF4-FFF2-40B4-BE49-F238E27FC236}">
-                <a16:creationId xmlns:a16="http://schemas.microsoft.com/office/drawing/2014/main" xmlns="" id="{BB5DD53B-EBB0-4739-AA1A-977E1FE83896}"/>
+                <a16:creationId xmlns="" xmlns:a16="http://schemas.microsoft.com/office/drawing/2014/main" id="{BB5DD53B-EBB0-4739-AA1A-977E1FE83896}"/>
               </a:ext>
             </a:extLst>
           </p:cNvPr>
@@ -7006,7 +7793,7 @@
           <p:cNvPr id="5" name="Imagem 4">
             <a:extLst>
               <a:ext uri="{FF2B5EF4-FFF2-40B4-BE49-F238E27FC236}">
-                <a16:creationId xmlns:a16="http://schemas.microsoft.com/office/drawing/2014/main" xmlns="" id="{5C821069-0DB8-489A-B78E-11B18B2FFCAF}"/>
+                <a16:creationId xmlns="" xmlns:a16="http://schemas.microsoft.com/office/drawing/2014/main" id="{5C821069-0DB8-489A-B78E-11B18B2FFCAF}"/>
               </a:ext>
             </a:extLst>
           </p:cNvPr>
@@ -7037,6 +7824,29 @@
           </a:prstGeom>
         </p:spPr>
       </p:pic>
+      <p:sp>
+        <p:nvSpPr>
+          <p:cNvPr id="4" name="Espaço Reservado para Número de Slide 3"/>
+          <p:cNvSpPr>
+            <a:spLocks noGrp="1"/>
+          </p:cNvSpPr>
+          <p:nvPr>
+            <p:ph type="sldNum" sz="quarter" idx="12"/>
+          </p:nvPr>
+        </p:nvSpPr>
+        <p:spPr/>
+        <p:txBody>
+          <a:bodyPr/>
+          <a:lstStyle/>
+          <a:p>
+            <a:fld id="{7B24AB6A-A7E8-49A3-9DDE-B468C885D9DF}" type="slidenum">
+              <a:rPr lang="pt-BR" smtClean="0"/>
+              <a:t>7</a:t>
+            </a:fld>
+            <a:endParaRPr lang="pt-BR"/>
+          </a:p>
+        </p:txBody>
+      </p:sp>
     </p:spTree>
     <p:extLst>
       <p:ext uri="{BB962C8B-B14F-4D97-AF65-F5344CB8AC3E}">
@@ -7047,6 +7857,13 @@
   <p:clrMapOvr>
     <a:masterClrMapping/>
   </p:clrMapOvr>
+  <p:timing>
+    <p:tnLst>
+      <p:par>
+        <p:cTn id="1" dur="indefinite" restart="never" nodeType="tmRoot"/>
+      </p:par>
+    </p:tnLst>
+  </p:timing>
 </p:sld>
 </file>
 
@@ -7072,7 +7889,7 @@
           <p:cNvPr id="2" name="Título 1">
             <a:extLst>
               <a:ext uri="{FF2B5EF4-FFF2-40B4-BE49-F238E27FC236}">
-                <a16:creationId xmlns:a16="http://schemas.microsoft.com/office/drawing/2014/main" xmlns="" id="{8E20EB79-7171-47E0-ACDE-F4B858F89259}"/>
+                <a16:creationId xmlns="" xmlns:a16="http://schemas.microsoft.com/office/drawing/2014/main" id="{8E20EB79-7171-47E0-ACDE-F4B858F89259}"/>
               </a:ext>
             </a:extLst>
           </p:cNvPr>
@@ -7128,7 +7945,7 @@
           <p:cNvPr id="3" name="Espaço Reservado para Conteúdo 2">
             <a:extLst>
               <a:ext uri="{FF2B5EF4-FFF2-40B4-BE49-F238E27FC236}">
-                <a16:creationId xmlns:a16="http://schemas.microsoft.com/office/drawing/2014/main" xmlns="" id="{BB5DD53B-EBB0-4739-AA1A-977E1FE83896}"/>
+                <a16:creationId xmlns="" xmlns:a16="http://schemas.microsoft.com/office/drawing/2014/main" id="{BB5DD53B-EBB0-4739-AA1A-977E1FE83896}"/>
               </a:ext>
             </a:extLst>
           </p:cNvPr>
@@ -7280,7 +8097,7 @@
           <p:cNvPr id="5" name="Imagem 4">
             <a:extLst>
               <a:ext uri="{FF2B5EF4-FFF2-40B4-BE49-F238E27FC236}">
-                <a16:creationId xmlns:a16="http://schemas.microsoft.com/office/drawing/2014/main" xmlns="" id="{5C821069-0DB8-489A-B78E-11B18B2FFCAF}"/>
+                <a16:creationId xmlns="" xmlns:a16="http://schemas.microsoft.com/office/drawing/2014/main" id="{5C821069-0DB8-489A-B78E-11B18B2FFCAF}"/>
               </a:ext>
             </a:extLst>
           </p:cNvPr>
@@ -7311,6 +8128,29 @@
           </a:prstGeom>
         </p:spPr>
       </p:pic>
+      <p:sp>
+        <p:nvSpPr>
+          <p:cNvPr id="4" name="Espaço Reservado para Número de Slide 3"/>
+          <p:cNvSpPr>
+            <a:spLocks noGrp="1"/>
+          </p:cNvSpPr>
+          <p:nvPr>
+            <p:ph type="sldNum" sz="quarter" idx="12"/>
+          </p:nvPr>
+        </p:nvSpPr>
+        <p:spPr/>
+        <p:txBody>
+          <a:bodyPr/>
+          <a:lstStyle/>
+          <a:p>
+            <a:fld id="{7B24AB6A-A7E8-49A3-9DDE-B468C885D9DF}" type="slidenum">
+              <a:rPr lang="pt-BR" smtClean="0"/>
+              <a:t>8</a:t>
+            </a:fld>
+            <a:endParaRPr lang="pt-BR"/>
+          </a:p>
+        </p:txBody>
+      </p:sp>
     </p:spTree>
     <p:extLst>
       <p:ext uri="{BB962C8B-B14F-4D97-AF65-F5344CB8AC3E}">
@@ -7321,6 +8161,13 @@
   <p:clrMapOvr>
     <a:masterClrMapping/>
   </p:clrMapOvr>
+  <p:timing>
+    <p:tnLst>
+      <p:par>
+        <p:cTn id="1" dur="indefinite" restart="never" nodeType="tmRoot"/>
+      </p:par>
+    </p:tnLst>
+  </p:timing>
 </p:sld>
 </file>
 
@@ -7346,7 +8193,7 @@
           <p:cNvPr id="2" name="Título 1">
             <a:extLst>
               <a:ext uri="{FF2B5EF4-FFF2-40B4-BE49-F238E27FC236}">
-                <a16:creationId xmlns:a16="http://schemas.microsoft.com/office/drawing/2014/main" xmlns="" id="{8E20EB79-7171-47E0-ACDE-F4B858F89259}"/>
+                <a16:creationId xmlns="" xmlns:a16="http://schemas.microsoft.com/office/drawing/2014/main" id="{8E20EB79-7171-47E0-ACDE-F4B858F89259}"/>
               </a:ext>
             </a:extLst>
           </p:cNvPr>
@@ -7388,7 +8235,7 @@
           <p:cNvPr id="3" name="Espaço Reservado para Conteúdo 2">
             <a:extLst>
               <a:ext uri="{FF2B5EF4-FFF2-40B4-BE49-F238E27FC236}">
-                <a16:creationId xmlns:a16="http://schemas.microsoft.com/office/drawing/2014/main" xmlns="" id="{BB5DD53B-EBB0-4739-AA1A-977E1FE83896}"/>
+                <a16:creationId xmlns="" xmlns:a16="http://schemas.microsoft.com/office/drawing/2014/main" id="{BB5DD53B-EBB0-4739-AA1A-977E1FE83896}"/>
               </a:ext>
             </a:extLst>
           </p:cNvPr>
@@ -7519,10 +8366,6 @@
               </a:rPr>
               <a:t>Serviços em execução</a:t>
             </a:r>
-            <a:endParaRPr lang="pt-BR" sz="2800" dirty="0" smtClean="0">
-              <a:latin typeface="Arial" panose="020B0604020202020204" pitchFamily="34" charset="0"/>
-              <a:cs typeface="Arial" panose="020B0604020202020204" pitchFamily="34" charset="0"/>
-            </a:endParaRPr>
           </a:p>
           <a:p>
             <a:pPr marL="0" indent="0" algn="just">
@@ -7567,7 +8410,7 @@
           <p:cNvPr id="5" name="Imagem 4">
             <a:extLst>
               <a:ext uri="{FF2B5EF4-FFF2-40B4-BE49-F238E27FC236}">
-                <a16:creationId xmlns:a16="http://schemas.microsoft.com/office/drawing/2014/main" xmlns="" id="{5C821069-0DB8-489A-B78E-11B18B2FFCAF}"/>
+                <a16:creationId xmlns="" xmlns:a16="http://schemas.microsoft.com/office/drawing/2014/main" id="{5C821069-0DB8-489A-B78E-11B18B2FFCAF}"/>
               </a:ext>
             </a:extLst>
           </p:cNvPr>
@@ -7603,7 +8446,7 @@
           <p:cNvPr id="6" name="Espaço Reservado para Conteúdo 2">
             <a:extLst>
               <a:ext uri="{FF2B5EF4-FFF2-40B4-BE49-F238E27FC236}">
-                <a16:creationId xmlns:a16="http://schemas.microsoft.com/office/drawing/2014/main" xmlns="" id="{BB5DD53B-EBB0-4739-AA1A-977E1FE83896}"/>
+                <a16:creationId xmlns="" xmlns:a16="http://schemas.microsoft.com/office/drawing/2014/main" id="{BB5DD53B-EBB0-4739-AA1A-977E1FE83896}"/>
               </a:ext>
             </a:extLst>
           </p:cNvPr>
@@ -7965,7 +8808,27 @@
                 <a:latin typeface="Arial" panose="020B0604020202020204" pitchFamily="34" charset="0"/>
                 <a:cs typeface="Arial" panose="020B0604020202020204" pitchFamily="34" charset="0"/>
               </a:rPr>
-              <a:t>Cadastro edição</a:t>
+              <a:t>Cadastro </a:t>
+            </a:r>
+            <a:r>
+              <a:rPr lang="pt-BR" sz="2800" dirty="0" smtClean="0">
+                <a:latin typeface="Arial" panose="020B0604020202020204" pitchFamily="34" charset="0"/>
+                <a:cs typeface="Arial" panose="020B0604020202020204" pitchFamily="34" charset="0"/>
+              </a:rPr>
+              <a:t>edição</a:t>
+            </a:r>
+          </a:p>
+          <a:p>
+            <a:pPr lvl="1">
+              <a:buFont typeface="Wingdings" panose="05000000000000000000" pitchFamily="2" charset="2"/>
+              <a:buChar char="§"/>
+            </a:pPr>
+            <a:r>
+              <a:rPr lang="pt-BR" sz="2800" dirty="0">
+                <a:latin typeface="Arial" panose="020B0604020202020204" pitchFamily="34" charset="0"/>
+                <a:cs typeface="Arial" panose="020B0604020202020204" pitchFamily="34" charset="0"/>
+              </a:rPr>
+              <a:t>Padrão de detalhes</a:t>
             </a:r>
           </a:p>
           <a:p>
@@ -7979,9 +8842,9 @@
             </a:endParaRPr>
           </a:p>
           <a:p>
-            <a:pPr marL="0" indent="0" algn="just">
-              <a:buFont typeface="Calibri" panose="020F0502020204030204" pitchFamily="34" charset="0"/>
-              <a:buNone/>
+            <a:pPr lvl="1">
+              <a:buFont typeface="Wingdings" panose="05000000000000000000" pitchFamily="2" charset="2"/>
+              <a:buChar char="§"/>
             </a:pPr>
             <a:endParaRPr lang="pt-BR" sz="2800" dirty="0" smtClean="0">
               <a:latin typeface="Arial" panose="020B0604020202020204" pitchFamily="34" charset="0"/>
@@ -7989,7 +8852,7 @@
             </a:endParaRPr>
           </a:p>
           <a:p>
-            <a:pPr marL="0" indent="0">
+            <a:pPr marL="0" indent="0" algn="just">
               <a:buFont typeface="Calibri" panose="020F0502020204030204" pitchFamily="34" charset="0"/>
               <a:buNone/>
             </a:pPr>
@@ -8013,10 +8876,43 @@
               <a:buFont typeface="Calibri" panose="020F0502020204030204" pitchFamily="34" charset="0"/>
               <a:buNone/>
             </a:pPr>
+            <a:endParaRPr lang="pt-BR" sz="2800" dirty="0" smtClean="0">
+              <a:latin typeface="Arial" panose="020B0604020202020204" pitchFamily="34" charset="0"/>
+              <a:cs typeface="Arial" panose="020B0604020202020204" pitchFamily="34" charset="0"/>
+            </a:endParaRPr>
+          </a:p>
+          <a:p>
+            <a:pPr marL="0" indent="0">
+              <a:buFont typeface="Calibri" panose="020F0502020204030204" pitchFamily="34" charset="0"/>
+              <a:buNone/>
+            </a:pPr>
             <a:endParaRPr lang="pt-BR" sz="2800" dirty="0">
               <a:latin typeface="Arial" panose="020B0604020202020204" pitchFamily="34" charset="0"/>
               <a:cs typeface="Arial" panose="020B0604020202020204" pitchFamily="34" charset="0"/>
             </a:endParaRPr>
+          </a:p>
+        </p:txBody>
+      </p:sp>
+      <p:sp>
+        <p:nvSpPr>
+          <p:cNvPr id="4" name="Espaço Reservado para Número de Slide 3"/>
+          <p:cNvSpPr>
+            <a:spLocks noGrp="1"/>
+          </p:cNvSpPr>
+          <p:nvPr>
+            <p:ph type="sldNum" sz="quarter" idx="12"/>
+          </p:nvPr>
+        </p:nvSpPr>
+        <p:spPr/>
+        <p:txBody>
+          <a:bodyPr/>
+          <a:lstStyle/>
+          <a:p>
+            <a:fld id="{7B24AB6A-A7E8-49A3-9DDE-B468C885D9DF}" type="slidenum">
+              <a:rPr lang="pt-BR" smtClean="0"/>
+              <a:t>9</a:t>
+            </a:fld>
+            <a:endParaRPr lang="pt-BR"/>
           </a:p>
         </p:txBody>
       </p:sp>
@@ -8030,6 +8926,13 @@
   <p:clrMapOvr>
     <a:masterClrMapping/>
   </p:clrMapOvr>
+  <p:timing>
+    <p:tnLst>
+      <p:par>
+        <p:cTn id="1" dur="indefinite" restart="never" nodeType="tmRoot"/>
+      </p:par>
+    </p:tnLst>
+  </p:timing>
 </p:sld>
 </file>
 
@@ -8314,4 +9217,265 @@
     </a:ext>
   </a:extLst>
 </a:theme>
+</file>
+
+<file path=ppt/theme/theme2.xml><?xml version="1.0" encoding="utf-8"?>
+<a:theme xmlns:a="http://schemas.openxmlformats.org/drawingml/2006/main" name="Tema do Office">
+  <a:themeElements>
+    <a:clrScheme name="Escritório">
+      <a:dk1>
+        <a:sysClr val="windowText" lastClr="000000"/>
+      </a:dk1>
+      <a:lt1>
+        <a:sysClr val="window" lastClr="FFFFFF"/>
+      </a:lt1>
+      <a:dk2>
+        <a:srgbClr val="44546A"/>
+      </a:dk2>
+      <a:lt2>
+        <a:srgbClr val="E7E6E6"/>
+      </a:lt2>
+      <a:accent1>
+        <a:srgbClr val="5B9BD5"/>
+      </a:accent1>
+      <a:accent2>
+        <a:srgbClr val="ED7D31"/>
+      </a:accent2>
+      <a:accent3>
+        <a:srgbClr val="A5A5A5"/>
+      </a:accent3>
+      <a:accent4>
+        <a:srgbClr val="FFC000"/>
+      </a:accent4>
+      <a:accent5>
+        <a:srgbClr val="4472C4"/>
+      </a:accent5>
+      <a:accent6>
+        <a:srgbClr val="70AD47"/>
+      </a:accent6>
+      <a:hlink>
+        <a:srgbClr val="0563C1"/>
+      </a:hlink>
+      <a:folHlink>
+        <a:srgbClr val="954F72"/>
+      </a:folHlink>
+    </a:clrScheme>
+    <a:fontScheme name="Escritório">
+      <a:majorFont>
+        <a:latin typeface="Calibri Light" panose="020F0302020204030204"/>
+        <a:ea typeface=""/>
+        <a:cs typeface=""/>
+        <a:font script="Jpan" typeface="ＭＳ Ｐゴシック"/>
+        <a:font script="Hang" typeface="맑은 고딕"/>
+        <a:font script="Hans" typeface="宋体"/>
+        <a:font script="Hant" typeface="新細明體"/>
+        <a:font script="Arab" typeface="Times New Roman"/>
+        <a:font script="Hebr" typeface="Times New Roman"/>
+        <a:font script="Thai" typeface="Angsana New"/>
+        <a:font script="Ethi" typeface="Nyala"/>
+        <a:font script="Beng" typeface="Vrinda"/>
+        <a:font script="Gujr" typeface="Shruti"/>
+        <a:font script="Khmr" typeface="MoolBoran"/>
+        <a:font script="Knda" typeface="Tunga"/>
+        <a:font script="Guru" typeface="Raavi"/>
+        <a:font script="Cans" typeface="Euphemia"/>
+        <a:font script="Cher" typeface="Plantagenet Cherokee"/>
+        <a:font script="Yiii" typeface="Microsoft Yi Baiti"/>
+        <a:font script="Tibt" typeface="Microsoft Himalaya"/>
+        <a:font script="Thaa" typeface="MV Boli"/>
+        <a:font script="Deva" typeface="Mangal"/>
+        <a:font script="Telu" typeface="Gautami"/>
+        <a:font script="Taml" typeface="Latha"/>
+        <a:font script="Syrc" typeface="Estrangelo Edessa"/>
+        <a:font script="Orya" typeface="Kalinga"/>
+        <a:font script="Mlym" typeface="Kartika"/>
+        <a:font script="Laoo" typeface="DokChampa"/>
+        <a:font script="Sinh" typeface="Iskoola Pota"/>
+        <a:font script="Mong" typeface="Mongolian Baiti"/>
+        <a:font script="Viet" typeface="Times New Roman"/>
+        <a:font script="Uigh" typeface="Microsoft Uighur"/>
+        <a:font script="Geor" typeface="Sylfaen"/>
+      </a:majorFont>
+      <a:minorFont>
+        <a:latin typeface="Calibri" panose="020F0502020204030204"/>
+        <a:ea typeface=""/>
+        <a:cs typeface=""/>
+        <a:font script="Jpan" typeface="ＭＳ Ｐゴシック"/>
+        <a:font script="Hang" typeface="맑은 고딕"/>
+        <a:font script="Hans" typeface="宋体"/>
+        <a:font script="Hant" typeface="新細明體"/>
+        <a:font script="Arab" typeface="Arial"/>
+        <a:font script="Hebr" typeface="Arial"/>
+        <a:font script="Thai" typeface="Cordia New"/>
+        <a:font script="Ethi" typeface="Nyala"/>
+        <a:font script="Beng" typeface="Vrinda"/>
+        <a:font script="Gujr" typeface="Shruti"/>
+        <a:font script="Khmr" typeface="DaunPenh"/>
+        <a:font script="Knda" typeface="Tunga"/>
+        <a:font script="Guru" typeface="Raavi"/>
+        <a:font script="Cans" typeface="Euphemia"/>
+        <a:font script="Cher" typeface="Plantagenet Cherokee"/>
+        <a:font script="Yiii" typeface="Microsoft Yi Baiti"/>
+        <a:font script="Tibt" typeface="Microsoft Himalaya"/>
+        <a:font script="Thaa" typeface="MV Boli"/>
+        <a:font script="Deva" typeface="Mangal"/>
+        <a:font script="Telu" typeface="Gautami"/>
+        <a:font script="Taml" typeface="Latha"/>
+        <a:font script="Syrc" typeface="Estrangelo Edessa"/>
+        <a:font script="Orya" typeface="Kalinga"/>
+        <a:font script="Mlym" typeface="Kartika"/>
+        <a:font script="Laoo" typeface="DokChampa"/>
+        <a:font script="Sinh" typeface="Iskoola Pota"/>
+        <a:font script="Mong" typeface="Mongolian Baiti"/>
+        <a:font script="Viet" typeface="Arial"/>
+        <a:font script="Uigh" typeface="Microsoft Uighur"/>
+        <a:font script="Geor" typeface="Sylfaen"/>
+      </a:minorFont>
+    </a:fontScheme>
+    <a:fmtScheme name="Escritório">
+      <a:fillStyleLst>
+        <a:solidFill>
+          <a:schemeClr val="phClr"/>
+        </a:solidFill>
+        <a:gradFill rotWithShape="1">
+          <a:gsLst>
+            <a:gs pos="0">
+              <a:schemeClr val="phClr">
+                <a:lumMod val="110000"/>
+                <a:satMod val="105000"/>
+                <a:tint val="67000"/>
+              </a:schemeClr>
+            </a:gs>
+            <a:gs pos="50000">
+              <a:schemeClr val="phClr">
+                <a:lumMod val="105000"/>
+                <a:satMod val="103000"/>
+                <a:tint val="73000"/>
+              </a:schemeClr>
+            </a:gs>
+            <a:gs pos="100000">
+              <a:schemeClr val="phClr">
+                <a:lumMod val="105000"/>
+                <a:satMod val="109000"/>
+                <a:tint val="81000"/>
+              </a:schemeClr>
+            </a:gs>
+          </a:gsLst>
+          <a:lin ang="5400000" scaled="0"/>
+        </a:gradFill>
+        <a:gradFill rotWithShape="1">
+          <a:gsLst>
+            <a:gs pos="0">
+              <a:schemeClr val="phClr">
+                <a:satMod val="103000"/>
+                <a:lumMod val="102000"/>
+                <a:tint val="94000"/>
+              </a:schemeClr>
+            </a:gs>
+            <a:gs pos="50000">
+              <a:schemeClr val="phClr">
+                <a:satMod val="110000"/>
+                <a:lumMod val="100000"/>
+                <a:shade val="100000"/>
+              </a:schemeClr>
+            </a:gs>
+            <a:gs pos="100000">
+              <a:schemeClr val="phClr">
+                <a:lumMod val="99000"/>
+                <a:satMod val="120000"/>
+                <a:shade val="78000"/>
+              </a:schemeClr>
+            </a:gs>
+          </a:gsLst>
+          <a:lin ang="5400000" scaled="0"/>
+        </a:gradFill>
+      </a:fillStyleLst>
+      <a:lnStyleLst>
+        <a:ln w="6350" cap="flat" cmpd="sng" algn="ctr">
+          <a:solidFill>
+            <a:schemeClr val="phClr"/>
+          </a:solidFill>
+          <a:prstDash val="solid"/>
+          <a:miter lim="800000"/>
+        </a:ln>
+        <a:ln w="12700" cap="flat" cmpd="sng" algn="ctr">
+          <a:solidFill>
+            <a:schemeClr val="phClr"/>
+          </a:solidFill>
+          <a:prstDash val="solid"/>
+          <a:miter lim="800000"/>
+        </a:ln>
+        <a:ln w="19050" cap="flat" cmpd="sng" algn="ctr">
+          <a:solidFill>
+            <a:schemeClr val="phClr"/>
+          </a:solidFill>
+          <a:prstDash val="solid"/>
+          <a:miter lim="800000"/>
+        </a:ln>
+      </a:lnStyleLst>
+      <a:effectStyleLst>
+        <a:effectStyle>
+          <a:effectLst/>
+        </a:effectStyle>
+        <a:effectStyle>
+          <a:effectLst/>
+        </a:effectStyle>
+        <a:effectStyle>
+          <a:effectLst>
+            <a:outerShdw blurRad="57150" dist="19050" dir="5400000" algn="ctr" rotWithShape="0">
+              <a:srgbClr val="000000">
+                <a:alpha val="63000"/>
+              </a:srgbClr>
+            </a:outerShdw>
+          </a:effectLst>
+        </a:effectStyle>
+      </a:effectStyleLst>
+      <a:bgFillStyleLst>
+        <a:solidFill>
+          <a:schemeClr val="phClr"/>
+        </a:solidFill>
+        <a:solidFill>
+          <a:schemeClr val="phClr">
+            <a:tint val="95000"/>
+            <a:satMod val="170000"/>
+          </a:schemeClr>
+        </a:solidFill>
+        <a:gradFill rotWithShape="1">
+          <a:gsLst>
+            <a:gs pos="0">
+              <a:schemeClr val="phClr">
+                <a:tint val="93000"/>
+                <a:satMod val="150000"/>
+                <a:shade val="98000"/>
+                <a:lumMod val="102000"/>
+              </a:schemeClr>
+            </a:gs>
+            <a:gs pos="50000">
+              <a:schemeClr val="phClr">
+                <a:tint val="98000"/>
+                <a:satMod val="130000"/>
+                <a:shade val="90000"/>
+                <a:lumMod val="103000"/>
+              </a:schemeClr>
+            </a:gs>
+            <a:gs pos="100000">
+              <a:schemeClr val="phClr">
+                <a:shade val="63000"/>
+                <a:satMod val="120000"/>
+              </a:schemeClr>
+            </a:gs>
+          </a:gsLst>
+          <a:lin ang="5400000" scaled="0"/>
+        </a:gradFill>
+      </a:bgFillStyleLst>
+    </a:fmtScheme>
+  </a:themeElements>
+  <a:objectDefaults/>
+  <a:extraClrSchemeLst/>
+  <a:extLst>
+    <a:ext uri="{05A4C25C-085E-4340-85A3-A5531E510DB2}">
+      <thm15:themeFamily xmlns:thm15="http://schemas.microsoft.com/office/thememl/2012/main" name="Office Theme" id="{62F939B6-93AF-4DB8-9C6B-D6C7DFDC589F}" vid="{4A3C46E8-61CC-4603-A589-7422A47A8E4A}"/>
+    </a:ext>
+  </a:extLst>
+</a:theme>
 </file>
</xml_diff>